<commit_message>
Updated: Bitcoin Pricing Data PowerPoint
Corrected spelling of team member names on Bitcoin Pricing Data Analysis PowerPoint
</commit_message>
<xml_diff>
--- a/Bitcoin Pricing Data Analysis.pptx
+++ b/Bitcoin Pricing Data Analysis.pptx
@@ -10388,8 +10388,8 @@
               <a:t>Thanks to my classmate Eric </a:t>
             </a:r>
             <a:r>
-              <a:rPr lang="en-US" sz="1600" b="1" dirty="0" err="1"/>
-              <a:t>Guarre</a:t>
+              <a:rPr lang="en-US" sz="1600" b="1"/>
+              <a:t>Garre</a:t>
             </a:r>
             <a:r>
               <a:rPr lang="en-US" sz="1600" b="1" dirty="0"/>

</xml_diff>